<commit_message>
Database schema is updated
</commit_message>
<xml_diff>
--- a/docs/Презентация.pptx
+++ b/docs/Презентация.pptx
@@ -7359,21 +7359,22 @@
       </p:sp>
       <p:pic>
         <p:nvPicPr>
-          <p:cNvPr id="5" name="image3.png"/>
-          <p:cNvPicPr/>
+          <p:cNvPr id="4" name="Picture 3"/>
+          <p:cNvPicPr>
+            <a:picLocks noChangeAspect="1"/>
+          </p:cNvPicPr>
           <p:nvPr/>
         </p:nvPicPr>
         <p:blipFill>
           <a:blip r:embed="rId2"/>
-          <a:srcRect l="2241" t="1941"/>
           <a:stretch>
             <a:fillRect/>
           </a:stretch>
         </p:blipFill>
-        <p:spPr bwMode="auto">
+        <p:spPr>
           <a:xfrm>
-            <a:off x="2123728" y="1268760"/>
-            <a:ext cx="4896544" cy="5328389"/>
+            <a:off x="1763688" y="1340590"/>
+            <a:ext cx="6331471" cy="5393783"/>
           </a:xfrm>
           <a:prstGeom prst="rect">
             <a:avLst/>
@@ -7605,11 +7606,7 @@
             </a:pPr>
             <a:r>
               <a:rPr lang="ru-RU" dirty="0" smtClean="0"/>
-              <a:t>Серверная </a:t>
-            </a:r>
-            <a:r>
-              <a:rPr lang="ru-RU" dirty="0" smtClean="0"/>
-              <a:t>часть:</a:t>
+              <a:t>Серверная часть:</a:t>
             </a:r>
           </a:p>
           <a:p>

</xml_diff>